<commit_message>
Few presentation details added
</commit_message>
<xml_diff>
--- a/presentations/anatomia-avancada/input-output.pptx
+++ b/presentations/anatomia-avancada/input-output.pptx
@@ -9,7 +9,7 @@
     <p:sldMasterId id="2147483764" r:id="rId9"/>
   </p:sldMasterIdLst>
   <p:notesMasterIdLst>
-    <p:notesMasterId r:id="rId36"/>
+    <p:notesMasterId r:id="rId38"/>
   </p:notesMasterIdLst>
   <p:sldIdLst>
     <p:sldId id="256" r:id="rId10"/>
@@ -23,21 +23,23 @@
     <p:sldId id="427" r:id="rId18"/>
     <p:sldId id="428" r:id="rId19"/>
     <p:sldId id="429" r:id="rId20"/>
-    <p:sldId id="412" r:id="rId21"/>
-    <p:sldId id="413" r:id="rId22"/>
-    <p:sldId id="411" r:id="rId23"/>
-    <p:sldId id="407" r:id="rId24"/>
-    <p:sldId id="408" r:id="rId25"/>
-    <p:sldId id="409" r:id="rId26"/>
-    <p:sldId id="410" r:id="rId27"/>
-    <p:sldId id="414" r:id="rId28"/>
-    <p:sldId id="415" r:id="rId29"/>
-    <p:sldId id="417" r:id="rId30"/>
-    <p:sldId id="418" r:id="rId31"/>
-    <p:sldId id="419" r:id="rId32"/>
-    <p:sldId id="420" r:id="rId33"/>
-    <p:sldId id="421" r:id="rId34"/>
-    <p:sldId id="422" r:id="rId35"/>
+    <p:sldId id="430" r:id="rId21"/>
+    <p:sldId id="431" r:id="rId22"/>
+    <p:sldId id="412" r:id="rId23"/>
+    <p:sldId id="413" r:id="rId24"/>
+    <p:sldId id="411" r:id="rId25"/>
+    <p:sldId id="407" r:id="rId26"/>
+    <p:sldId id="408" r:id="rId27"/>
+    <p:sldId id="409" r:id="rId28"/>
+    <p:sldId id="410" r:id="rId29"/>
+    <p:sldId id="414" r:id="rId30"/>
+    <p:sldId id="415" r:id="rId31"/>
+    <p:sldId id="417" r:id="rId32"/>
+    <p:sldId id="418" r:id="rId33"/>
+    <p:sldId id="419" r:id="rId34"/>
+    <p:sldId id="420" r:id="rId35"/>
+    <p:sldId id="421" r:id="rId36"/>
+    <p:sldId id="422" r:id="rId37"/>
   </p:sldIdLst>
   <p:sldSz cx="12192000" cy="6858000"/>
   <p:notesSz cx="6858000" cy="9144000"/>
@@ -164,6 +166,12 @@
             <p14:sldId id="427"/>
             <p14:sldId id="428"/>
             <p14:sldId id="429"/>
+            <p14:sldId id="430"/>
+            <p14:sldId id="431"/>
+          </p14:sldIdLst>
+        </p14:section>
+        <p14:section name="Seção sem Título" id="{63426683-E286-432C-8132-60ADC3A545A8}">
+          <p14:sldIdLst>
             <p14:sldId id="412"/>
             <p14:sldId id="413"/>
             <p14:sldId id="411"/>
@@ -9182,6 +9190,1465 @@
         <p:spPr>
           <a:xfrm>
             <a:off x="960792" y="1524000"/>
+            <a:ext cx="10270415" cy="360218"/>
+          </a:xfrm>
+        </p:spPr>
+        <p:txBody>
+          <a:bodyPr/>
+          <a:lstStyle/>
+          <a:p>
+            <a:r>
+              <a:rPr lang="pt-BR" dirty="0" smtClean="0"/>
+              <a:t>Como fazer uma requisição com o serviço </a:t>
+            </a:r>
+            <a:r>
+              <a:rPr lang="pt-BR" dirty="0" err="1" smtClean="0"/>
+              <a:t>HttpClient</a:t>
+            </a:r>
+            <a:r>
+              <a:rPr lang="pt-BR" dirty="0"/>
+              <a:t>:</a:t>
+            </a:r>
+            <a:endParaRPr lang="pt-BR" dirty="0" smtClean="0"/>
+          </a:p>
+        </p:txBody>
+      </p:sp>
+      <p:sp>
+        <p:nvSpPr>
+          <p:cNvPr id="6" name="Title 5"/>
+          <p:cNvSpPr>
+            <a:spLocks noGrp="1"/>
+          </p:cNvSpPr>
+          <p:nvPr>
+            <p:ph type="title"/>
+          </p:nvPr>
+        </p:nvSpPr>
+        <p:spPr/>
+        <p:txBody>
+          <a:bodyPr/>
+          <a:lstStyle/>
+          <a:p>
+            <a:r>
+              <a:rPr lang="en-US" dirty="0" smtClean="0"/>
+              <a:t>A </a:t>
+            </a:r>
+            <a:r>
+              <a:rPr lang="en-US" dirty="0" err="1" smtClean="0"/>
+              <a:t>classe</a:t>
+            </a:r>
+            <a:r>
+              <a:rPr lang="en-US" dirty="0" smtClean="0"/>
+              <a:t> </a:t>
+            </a:r>
+            <a:r>
+              <a:rPr lang="en-US" dirty="0" err="1" smtClean="0"/>
+              <a:t>HttpClient</a:t>
+            </a:r>
+            <a:r>
+              <a:rPr lang="en-US" dirty="0" smtClean="0"/>
+              <a:t> do Angular</a:t>
+            </a:r>
+            <a:endParaRPr lang="en-US" dirty="0"/>
+          </a:p>
+        </p:txBody>
+      </p:sp>
+      <p:sp>
+        <p:nvSpPr>
+          <p:cNvPr id="2" name="Retângulo 1"/>
+          <p:cNvSpPr/>
+          <p:nvPr/>
+        </p:nvSpPr>
+        <p:spPr>
+          <a:xfrm>
+            <a:off x="960792" y="2573337"/>
+            <a:ext cx="6096000" cy="830997"/>
+          </a:xfrm>
+          <a:prstGeom prst="rect">
+            <a:avLst/>
+          </a:prstGeom>
+        </p:spPr>
+        <p:txBody>
+          <a:bodyPr>
+            <a:spAutoFit/>
+          </a:bodyPr>
+          <a:lstStyle/>
+          <a:p>
+            <a:r>
+              <a:rPr lang="pt-BR" sz="1600" dirty="0" err="1">
+                <a:solidFill>
+                  <a:srgbClr val="569CD6"/>
+                </a:solidFill>
+                <a:latin typeface="Consolas" panose="020B0609020204030204" pitchFamily="49" charset="0"/>
+              </a:rPr>
+              <a:t>public</a:t>
+            </a:r>
+            <a:r>
+              <a:rPr lang="pt-BR" sz="1600" dirty="0">
+                <a:solidFill>
+                  <a:srgbClr val="D4D4D4"/>
+                </a:solidFill>
+                <a:latin typeface="Consolas" panose="020B0609020204030204" pitchFamily="49" charset="0"/>
+              </a:rPr>
+              <a:t> </a:t>
+            </a:r>
+            <a:r>
+              <a:rPr lang="pt-BR" sz="1600" dirty="0" err="1">
+                <a:solidFill>
+                  <a:srgbClr val="DCDCAA"/>
+                </a:solidFill>
+                <a:latin typeface="Consolas" panose="020B0609020204030204" pitchFamily="49" charset="0"/>
+              </a:rPr>
+              <a:t>fazerRequisicao</a:t>
+            </a:r>
+            <a:r>
+              <a:rPr lang="pt-BR" sz="1600" dirty="0">
+                <a:solidFill>
+                  <a:srgbClr val="D4D4D4"/>
+                </a:solidFill>
+                <a:latin typeface="Consolas" panose="020B0609020204030204" pitchFamily="49" charset="0"/>
+              </a:rPr>
+              <a:t>() {</a:t>
+            </a:r>
+          </a:p>
+          <a:p>
+            <a:r>
+              <a:rPr lang="pt-BR" sz="1600" dirty="0" smtClean="0">
+                <a:solidFill>
+                  <a:srgbClr val="C586C0"/>
+                </a:solidFill>
+                <a:latin typeface="Consolas" panose="020B0609020204030204" pitchFamily="49" charset="0"/>
+              </a:rPr>
+              <a:t>  </a:t>
+            </a:r>
+            <a:r>
+              <a:rPr lang="pt-BR" sz="1600" dirty="0" err="1" smtClean="0">
+                <a:solidFill>
+                  <a:srgbClr val="C586C0"/>
+                </a:solidFill>
+                <a:latin typeface="Consolas" panose="020B0609020204030204" pitchFamily="49" charset="0"/>
+              </a:rPr>
+              <a:t>return</a:t>
+            </a:r>
+            <a:r>
+              <a:rPr lang="pt-BR" sz="1600" dirty="0" smtClean="0">
+                <a:solidFill>
+                  <a:srgbClr val="D4D4D4"/>
+                </a:solidFill>
+                <a:latin typeface="Consolas" panose="020B0609020204030204" pitchFamily="49" charset="0"/>
+              </a:rPr>
+              <a:t> </a:t>
+            </a:r>
+            <a:r>
+              <a:rPr lang="pt-BR" sz="1600" dirty="0" err="1">
+                <a:solidFill>
+                  <a:srgbClr val="569CD6"/>
+                </a:solidFill>
+                <a:latin typeface="Consolas" panose="020B0609020204030204" pitchFamily="49" charset="0"/>
+              </a:rPr>
+              <a:t>this</a:t>
+            </a:r>
+            <a:r>
+              <a:rPr lang="pt-BR" sz="1600" dirty="0" err="1">
+                <a:solidFill>
+                  <a:srgbClr val="D4D4D4"/>
+                </a:solidFill>
+                <a:latin typeface="Consolas" panose="020B0609020204030204" pitchFamily="49" charset="0"/>
+              </a:rPr>
+              <a:t>.</a:t>
+            </a:r>
+            <a:r>
+              <a:rPr lang="pt-BR" sz="1600" dirty="0" err="1">
+                <a:solidFill>
+                  <a:srgbClr val="9CDCFE"/>
+                </a:solidFill>
+                <a:latin typeface="Consolas" panose="020B0609020204030204" pitchFamily="49" charset="0"/>
+              </a:rPr>
+              <a:t>http</a:t>
+            </a:r>
+            <a:r>
+              <a:rPr lang="pt-BR" sz="1600" dirty="0" err="1">
+                <a:solidFill>
+                  <a:srgbClr val="D4D4D4"/>
+                </a:solidFill>
+                <a:latin typeface="Consolas" panose="020B0609020204030204" pitchFamily="49" charset="0"/>
+              </a:rPr>
+              <a:t>.</a:t>
+            </a:r>
+            <a:r>
+              <a:rPr lang="pt-BR" sz="1600" dirty="0" err="1">
+                <a:solidFill>
+                  <a:srgbClr val="DCDCAA"/>
+                </a:solidFill>
+                <a:latin typeface="Consolas" panose="020B0609020204030204" pitchFamily="49" charset="0"/>
+              </a:rPr>
+              <a:t>get</a:t>
+            </a:r>
+            <a:r>
+              <a:rPr lang="pt-BR" sz="1600" dirty="0">
+                <a:solidFill>
+                  <a:srgbClr val="D4D4D4"/>
+                </a:solidFill>
+                <a:latin typeface="Consolas" panose="020B0609020204030204" pitchFamily="49" charset="0"/>
+              </a:rPr>
+              <a:t>(</a:t>
+            </a:r>
+            <a:r>
+              <a:rPr lang="pt-BR" sz="1600" dirty="0">
+                <a:solidFill>
+                  <a:srgbClr val="CE9178"/>
+                </a:solidFill>
+                <a:latin typeface="Consolas" panose="020B0609020204030204" pitchFamily="49" charset="0"/>
+              </a:rPr>
+              <a:t>'</a:t>
+            </a:r>
+            <a:r>
+              <a:rPr lang="pt-BR" sz="1600" dirty="0" err="1">
+                <a:solidFill>
+                  <a:srgbClr val="CE9178"/>
+                </a:solidFill>
+                <a:latin typeface="Consolas" panose="020B0609020204030204" pitchFamily="49" charset="0"/>
+              </a:rPr>
+              <a:t>sua_url_aqui</a:t>
+            </a:r>
+            <a:r>
+              <a:rPr lang="pt-BR" sz="1600" dirty="0">
+                <a:solidFill>
+                  <a:srgbClr val="CE9178"/>
+                </a:solidFill>
+                <a:latin typeface="Consolas" panose="020B0609020204030204" pitchFamily="49" charset="0"/>
+              </a:rPr>
+              <a:t>'</a:t>
+            </a:r>
+            <a:r>
+              <a:rPr lang="pt-BR" sz="1600" dirty="0">
+                <a:solidFill>
+                  <a:srgbClr val="D4D4D4"/>
+                </a:solidFill>
+                <a:latin typeface="Consolas" panose="020B0609020204030204" pitchFamily="49" charset="0"/>
+              </a:rPr>
+              <a:t>);</a:t>
+            </a:r>
+          </a:p>
+          <a:p>
+            <a:r>
+              <a:rPr lang="pt-BR" sz="1600" dirty="0">
+                <a:solidFill>
+                  <a:srgbClr val="D4D4D4"/>
+                </a:solidFill>
+                <a:latin typeface="Consolas" panose="020B0609020204030204" pitchFamily="49" charset="0"/>
+              </a:rPr>
+              <a:t>}</a:t>
+            </a:r>
+            <a:endParaRPr lang="pt-BR" sz="1600" b="0" dirty="0">
+              <a:solidFill>
+                <a:srgbClr val="D4D4D4"/>
+              </a:solidFill>
+              <a:effectLst/>
+              <a:latin typeface="Consolas" panose="020B0609020204030204" pitchFamily="49" charset="0"/>
+            </a:endParaRPr>
+          </a:p>
+        </p:txBody>
+      </p:sp>
+      <p:sp>
+        <p:nvSpPr>
+          <p:cNvPr id="8" name="Content Placeholder 6"/>
+          <p:cNvSpPr txBox="1">
+            <a:spLocks/>
+          </p:cNvSpPr>
+          <p:nvPr/>
+        </p:nvSpPr>
+        <p:spPr>
+          <a:xfrm>
+            <a:off x="960793" y="2213119"/>
+            <a:ext cx="5079790" cy="360218"/>
+          </a:xfrm>
+          <a:prstGeom prst="rect">
+            <a:avLst/>
+          </a:prstGeom>
+        </p:spPr>
+        <p:txBody>
+          <a:bodyPr vert="horz" lIns="91440" tIns="45720" rIns="91440" bIns="45720" rtlCol="0">
+            <a:noAutofit/>
+          </a:bodyPr>
+          <a:lstStyle>
+            <a:lvl1pPr marL="0" indent="0" algn="l" defTabSz="914400" rtl="0" eaLnBrk="1" latinLnBrk="0" hangingPunct="1">
+              <a:lnSpc>
+                <a:spcPct val="90000"/>
+              </a:lnSpc>
+              <a:spcBef>
+                <a:spcPts val="1000"/>
+              </a:spcBef>
+              <a:buFont typeface="Arial"/>
+              <a:buNone/>
+              <a:defRPr sz="2000" b="0" i="0" kern="1200">
+                <a:solidFill>
+                  <a:schemeClr val="tx1"/>
+                </a:solidFill>
+                <a:latin typeface="Segoe UI Light" charset="0"/>
+                <a:ea typeface="Segoe UI Light" charset="0"/>
+                <a:cs typeface="Segoe UI Light" charset="0"/>
+              </a:defRPr>
+            </a:lvl1pPr>
+            <a:lvl2pPr marL="685800" indent="-228600" algn="l" defTabSz="914400" rtl="0" eaLnBrk="1" latinLnBrk="0" hangingPunct="1">
+              <a:lnSpc>
+                <a:spcPct val="90000"/>
+              </a:lnSpc>
+              <a:spcBef>
+                <a:spcPts val="500"/>
+              </a:spcBef>
+              <a:buFont typeface="Arial"/>
+              <a:buChar char="•"/>
+              <a:defRPr sz="1800" b="0" i="0" kern="1200">
+                <a:solidFill>
+                  <a:schemeClr val="tx1"/>
+                </a:solidFill>
+                <a:latin typeface="Segoe UI Light" charset="0"/>
+                <a:ea typeface="Segoe UI Light" charset="0"/>
+                <a:cs typeface="Segoe UI Light" charset="0"/>
+              </a:defRPr>
+            </a:lvl2pPr>
+            <a:lvl3pPr marL="1143000" indent="-228600" algn="l" defTabSz="914400" rtl="0" eaLnBrk="1" latinLnBrk="0" hangingPunct="1">
+              <a:lnSpc>
+                <a:spcPct val="90000"/>
+              </a:lnSpc>
+              <a:spcBef>
+                <a:spcPts val="500"/>
+              </a:spcBef>
+              <a:buFont typeface="Arial"/>
+              <a:buChar char="•"/>
+              <a:defRPr sz="1600" b="0" i="0" kern="1200">
+                <a:solidFill>
+                  <a:schemeClr val="tx1"/>
+                </a:solidFill>
+                <a:latin typeface="Segoe UI Light" charset="0"/>
+                <a:ea typeface="Segoe UI Light" charset="0"/>
+                <a:cs typeface="Segoe UI Light" charset="0"/>
+              </a:defRPr>
+            </a:lvl3pPr>
+            <a:lvl4pPr marL="1600200" indent="-228600" algn="l" defTabSz="914400" rtl="0" eaLnBrk="1" latinLnBrk="0" hangingPunct="1">
+              <a:lnSpc>
+                <a:spcPct val="90000"/>
+              </a:lnSpc>
+              <a:spcBef>
+                <a:spcPts val="500"/>
+              </a:spcBef>
+              <a:buFont typeface="Arial"/>
+              <a:buChar char="•"/>
+              <a:defRPr sz="1400" b="0" i="0" kern="1200">
+                <a:solidFill>
+                  <a:schemeClr val="tx1"/>
+                </a:solidFill>
+                <a:latin typeface="Segoe UI Light" charset="0"/>
+                <a:ea typeface="Segoe UI Light" charset="0"/>
+                <a:cs typeface="Segoe UI Light" charset="0"/>
+              </a:defRPr>
+            </a:lvl4pPr>
+            <a:lvl5pPr marL="2057400" indent="-228600" algn="l" defTabSz="914400" rtl="0" eaLnBrk="1" latinLnBrk="0" hangingPunct="1">
+              <a:lnSpc>
+                <a:spcPct val="90000"/>
+              </a:lnSpc>
+              <a:spcBef>
+                <a:spcPts val="500"/>
+              </a:spcBef>
+              <a:buFont typeface="Arial"/>
+              <a:buChar char="•"/>
+              <a:defRPr sz="1400" b="0" i="0" kern="1200">
+                <a:solidFill>
+                  <a:schemeClr val="tx1"/>
+                </a:solidFill>
+                <a:latin typeface="Segoe UI Light" charset="0"/>
+                <a:ea typeface="Segoe UI Light" charset="0"/>
+                <a:cs typeface="Segoe UI Light" charset="0"/>
+              </a:defRPr>
+            </a:lvl5pPr>
+            <a:lvl6pPr marL="2514600" indent="-228600" algn="l" defTabSz="914400" rtl="0" eaLnBrk="1" latinLnBrk="0" hangingPunct="1">
+              <a:lnSpc>
+                <a:spcPct val="90000"/>
+              </a:lnSpc>
+              <a:spcBef>
+                <a:spcPts val="500"/>
+              </a:spcBef>
+              <a:buFont typeface="Arial"/>
+              <a:buChar char="•"/>
+              <a:defRPr sz="1800" kern="1200">
+                <a:solidFill>
+                  <a:schemeClr val="tx1"/>
+                </a:solidFill>
+                <a:latin typeface="+mn-lt"/>
+                <a:ea typeface="+mn-ea"/>
+                <a:cs typeface="+mn-cs"/>
+              </a:defRPr>
+            </a:lvl6pPr>
+            <a:lvl7pPr marL="2971800" indent="-228600" algn="l" defTabSz="914400" rtl="0" eaLnBrk="1" latinLnBrk="0" hangingPunct="1">
+              <a:lnSpc>
+                <a:spcPct val="90000"/>
+              </a:lnSpc>
+              <a:spcBef>
+                <a:spcPts val="500"/>
+              </a:spcBef>
+              <a:buFont typeface="Arial"/>
+              <a:buChar char="•"/>
+              <a:defRPr sz="1800" kern="1200">
+                <a:solidFill>
+                  <a:schemeClr val="tx1"/>
+                </a:solidFill>
+                <a:latin typeface="+mn-lt"/>
+                <a:ea typeface="+mn-ea"/>
+                <a:cs typeface="+mn-cs"/>
+              </a:defRPr>
+            </a:lvl7pPr>
+            <a:lvl8pPr marL="3429000" indent="-228600" algn="l" defTabSz="914400" rtl="0" eaLnBrk="1" latinLnBrk="0" hangingPunct="1">
+              <a:lnSpc>
+                <a:spcPct val="90000"/>
+              </a:lnSpc>
+              <a:spcBef>
+                <a:spcPts val="500"/>
+              </a:spcBef>
+              <a:buFont typeface="Arial"/>
+              <a:buChar char="•"/>
+              <a:defRPr sz="1800" kern="1200">
+                <a:solidFill>
+                  <a:schemeClr val="tx1"/>
+                </a:solidFill>
+                <a:latin typeface="+mn-lt"/>
+                <a:ea typeface="+mn-ea"/>
+                <a:cs typeface="+mn-cs"/>
+              </a:defRPr>
+            </a:lvl8pPr>
+            <a:lvl9pPr marL="3886200" indent="-228600" algn="l" defTabSz="914400" rtl="0" eaLnBrk="1" latinLnBrk="0" hangingPunct="1">
+              <a:lnSpc>
+                <a:spcPct val="90000"/>
+              </a:lnSpc>
+              <a:spcBef>
+                <a:spcPts val="500"/>
+              </a:spcBef>
+              <a:buFont typeface="Arial"/>
+              <a:buChar char="•"/>
+              <a:defRPr sz="1800" kern="1200">
+                <a:solidFill>
+                  <a:schemeClr val="tx1"/>
+                </a:solidFill>
+                <a:latin typeface="+mn-lt"/>
+                <a:ea typeface="+mn-ea"/>
+                <a:cs typeface="+mn-cs"/>
+              </a:defRPr>
+            </a:lvl9pPr>
+          </a:lstStyle>
+          <a:p>
+            <a:r>
+              <a:rPr lang="pt-BR" b="1" dirty="0" smtClean="0">
+                <a:latin typeface="Segoe UI" panose="020B0502040204020203" pitchFamily="34" charset="0"/>
+                <a:cs typeface="Segoe UI" panose="020B0502040204020203" pitchFamily="34" charset="0"/>
+              </a:rPr>
+              <a:t>Requisição GET:</a:t>
+            </a:r>
+            <a:endParaRPr lang="pt-BR" b="1" dirty="0" smtClean="0">
+              <a:latin typeface="Segoe UI" panose="020B0502040204020203" pitchFamily="34" charset="0"/>
+              <a:cs typeface="Segoe UI" panose="020B0502040204020203" pitchFamily="34" charset="0"/>
+            </a:endParaRPr>
+          </a:p>
+        </p:txBody>
+      </p:sp>
+      <p:sp>
+        <p:nvSpPr>
+          <p:cNvPr id="9" name="Retângulo 8"/>
+          <p:cNvSpPr/>
+          <p:nvPr/>
+        </p:nvSpPr>
+        <p:spPr>
+          <a:xfrm>
+            <a:off x="960791" y="3991119"/>
+            <a:ext cx="6742335" cy="830997"/>
+          </a:xfrm>
+          <a:prstGeom prst="rect">
+            <a:avLst/>
+          </a:prstGeom>
+        </p:spPr>
+        <p:txBody>
+          <a:bodyPr wrap="square">
+            <a:spAutoFit/>
+          </a:bodyPr>
+          <a:lstStyle/>
+          <a:p>
+            <a:r>
+              <a:rPr lang="pt-BR" sz="1600" dirty="0" err="1">
+                <a:solidFill>
+                  <a:srgbClr val="569CD6"/>
+                </a:solidFill>
+                <a:latin typeface="Consolas" panose="020B0609020204030204" pitchFamily="49" charset="0"/>
+              </a:rPr>
+              <a:t>public</a:t>
+            </a:r>
+            <a:r>
+              <a:rPr lang="pt-BR" sz="1600" dirty="0">
+                <a:solidFill>
+                  <a:srgbClr val="D4D4D4"/>
+                </a:solidFill>
+                <a:latin typeface="Consolas" panose="020B0609020204030204" pitchFamily="49" charset="0"/>
+              </a:rPr>
+              <a:t> </a:t>
+            </a:r>
+            <a:r>
+              <a:rPr lang="pt-BR" sz="1600" dirty="0" err="1">
+                <a:solidFill>
+                  <a:srgbClr val="DCDCAA"/>
+                </a:solidFill>
+                <a:latin typeface="Consolas" panose="020B0609020204030204" pitchFamily="49" charset="0"/>
+              </a:rPr>
+              <a:t>fazerRequisicao</a:t>
+            </a:r>
+            <a:r>
+              <a:rPr lang="pt-BR" sz="1600" dirty="0">
+                <a:solidFill>
+                  <a:srgbClr val="D4D4D4"/>
+                </a:solidFill>
+                <a:latin typeface="Consolas" panose="020B0609020204030204" pitchFamily="49" charset="0"/>
+              </a:rPr>
+              <a:t>() {</a:t>
+            </a:r>
+          </a:p>
+          <a:p>
+            <a:r>
+              <a:rPr lang="pt-BR" sz="1600" dirty="0" smtClean="0">
+                <a:solidFill>
+                  <a:srgbClr val="C586C0"/>
+                </a:solidFill>
+                <a:latin typeface="Consolas" panose="020B0609020204030204" pitchFamily="49" charset="0"/>
+              </a:rPr>
+              <a:t>  </a:t>
+            </a:r>
+            <a:r>
+              <a:rPr lang="pt-BR" sz="1600" dirty="0" err="1" smtClean="0">
+                <a:solidFill>
+                  <a:srgbClr val="C586C0"/>
+                </a:solidFill>
+                <a:latin typeface="Consolas" panose="020B0609020204030204" pitchFamily="49" charset="0"/>
+              </a:rPr>
+              <a:t>return</a:t>
+            </a:r>
+            <a:r>
+              <a:rPr lang="pt-BR" sz="1600" dirty="0" smtClean="0">
+                <a:solidFill>
+                  <a:srgbClr val="D4D4D4"/>
+                </a:solidFill>
+                <a:latin typeface="Consolas" panose="020B0609020204030204" pitchFamily="49" charset="0"/>
+              </a:rPr>
+              <a:t> </a:t>
+            </a:r>
+            <a:r>
+              <a:rPr lang="pt-BR" sz="1600" dirty="0" err="1">
+                <a:solidFill>
+                  <a:srgbClr val="569CD6"/>
+                </a:solidFill>
+                <a:latin typeface="Consolas" panose="020B0609020204030204" pitchFamily="49" charset="0"/>
+              </a:rPr>
+              <a:t>this</a:t>
+            </a:r>
+            <a:r>
+              <a:rPr lang="pt-BR" sz="1600" dirty="0" err="1">
+                <a:solidFill>
+                  <a:srgbClr val="D4D4D4"/>
+                </a:solidFill>
+                <a:latin typeface="Consolas" panose="020B0609020204030204" pitchFamily="49" charset="0"/>
+              </a:rPr>
+              <a:t>.</a:t>
+            </a:r>
+            <a:r>
+              <a:rPr lang="pt-BR" sz="1600" dirty="0" err="1">
+                <a:solidFill>
+                  <a:srgbClr val="9CDCFE"/>
+                </a:solidFill>
+                <a:latin typeface="Consolas" panose="020B0609020204030204" pitchFamily="49" charset="0"/>
+              </a:rPr>
+              <a:t>http</a:t>
+            </a:r>
+            <a:r>
+              <a:rPr lang="pt-BR" sz="1600" dirty="0" err="1">
+                <a:solidFill>
+                  <a:srgbClr val="D4D4D4"/>
+                </a:solidFill>
+                <a:latin typeface="Consolas" panose="020B0609020204030204" pitchFamily="49" charset="0"/>
+              </a:rPr>
+              <a:t>.</a:t>
+            </a:r>
+            <a:r>
+              <a:rPr lang="pt-BR" sz="1600" dirty="0" err="1">
+                <a:solidFill>
+                  <a:srgbClr val="DCDCAA"/>
+                </a:solidFill>
+                <a:latin typeface="Consolas" panose="020B0609020204030204" pitchFamily="49" charset="0"/>
+              </a:rPr>
+              <a:t>post</a:t>
+            </a:r>
+            <a:r>
+              <a:rPr lang="pt-BR" sz="1600" dirty="0">
+                <a:solidFill>
+                  <a:srgbClr val="D4D4D4"/>
+                </a:solidFill>
+                <a:latin typeface="Consolas" panose="020B0609020204030204" pitchFamily="49" charset="0"/>
+              </a:rPr>
+              <a:t>(</a:t>
+            </a:r>
+            <a:r>
+              <a:rPr lang="pt-BR" sz="1600" dirty="0">
+                <a:solidFill>
+                  <a:srgbClr val="CE9178"/>
+                </a:solidFill>
+                <a:latin typeface="Consolas" panose="020B0609020204030204" pitchFamily="49" charset="0"/>
+              </a:rPr>
+              <a:t>'</a:t>
+            </a:r>
+            <a:r>
+              <a:rPr lang="pt-BR" sz="1600" dirty="0" err="1">
+                <a:solidFill>
+                  <a:srgbClr val="CE9178"/>
+                </a:solidFill>
+                <a:latin typeface="Consolas" panose="020B0609020204030204" pitchFamily="49" charset="0"/>
+              </a:rPr>
+              <a:t>sua_url_aqui</a:t>
+            </a:r>
+            <a:r>
+              <a:rPr lang="pt-BR" sz="1600" dirty="0">
+                <a:solidFill>
+                  <a:srgbClr val="CE9178"/>
+                </a:solidFill>
+                <a:latin typeface="Consolas" panose="020B0609020204030204" pitchFamily="49" charset="0"/>
+              </a:rPr>
+              <a:t>'</a:t>
+            </a:r>
+            <a:r>
+              <a:rPr lang="pt-BR" sz="1600" dirty="0">
+                <a:solidFill>
+                  <a:srgbClr val="D4D4D4"/>
+                </a:solidFill>
+                <a:latin typeface="Consolas" panose="020B0609020204030204" pitchFamily="49" charset="0"/>
+              </a:rPr>
+              <a:t>, </a:t>
+            </a:r>
+            <a:r>
+              <a:rPr lang="pt-BR" sz="1600" dirty="0" err="1">
+                <a:solidFill>
+                  <a:srgbClr val="9CDCFE"/>
+                </a:solidFill>
+                <a:latin typeface="Consolas" panose="020B0609020204030204" pitchFamily="49" charset="0"/>
+              </a:rPr>
+              <a:t>dados_post_enviar</a:t>
+            </a:r>
+            <a:r>
+              <a:rPr lang="pt-BR" sz="1600" dirty="0">
+                <a:solidFill>
+                  <a:srgbClr val="D4D4D4"/>
+                </a:solidFill>
+                <a:latin typeface="Consolas" panose="020B0609020204030204" pitchFamily="49" charset="0"/>
+              </a:rPr>
+              <a:t>);</a:t>
+            </a:r>
+          </a:p>
+          <a:p>
+            <a:r>
+              <a:rPr lang="pt-BR" sz="1600" dirty="0">
+                <a:solidFill>
+                  <a:srgbClr val="D4D4D4"/>
+                </a:solidFill>
+                <a:latin typeface="Consolas" panose="020B0609020204030204" pitchFamily="49" charset="0"/>
+              </a:rPr>
+              <a:t>}</a:t>
+            </a:r>
+            <a:endParaRPr lang="pt-BR" sz="1600" b="0" dirty="0">
+              <a:solidFill>
+                <a:srgbClr val="D4D4D4"/>
+              </a:solidFill>
+              <a:effectLst/>
+              <a:latin typeface="Consolas" panose="020B0609020204030204" pitchFamily="49" charset="0"/>
+            </a:endParaRPr>
+          </a:p>
+        </p:txBody>
+      </p:sp>
+      <p:sp>
+        <p:nvSpPr>
+          <p:cNvPr id="10" name="Content Placeholder 6"/>
+          <p:cNvSpPr txBox="1">
+            <a:spLocks/>
+          </p:cNvSpPr>
+          <p:nvPr/>
+        </p:nvSpPr>
+        <p:spPr>
+          <a:xfrm>
+            <a:off x="960793" y="3630901"/>
+            <a:ext cx="5079790" cy="360218"/>
+          </a:xfrm>
+          <a:prstGeom prst="rect">
+            <a:avLst/>
+          </a:prstGeom>
+        </p:spPr>
+        <p:txBody>
+          <a:bodyPr vert="horz" lIns="91440" tIns="45720" rIns="91440" bIns="45720" rtlCol="0">
+            <a:noAutofit/>
+          </a:bodyPr>
+          <a:lstStyle>
+            <a:lvl1pPr marL="0" indent="0" algn="l" defTabSz="914400" rtl="0" eaLnBrk="1" latinLnBrk="0" hangingPunct="1">
+              <a:lnSpc>
+                <a:spcPct val="90000"/>
+              </a:lnSpc>
+              <a:spcBef>
+                <a:spcPts val="1000"/>
+              </a:spcBef>
+              <a:buFont typeface="Arial"/>
+              <a:buNone/>
+              <a:defRPr sz="2000" b="0" i="0" kern="1200">
+                <a:solidFill>
+                  <a:schemeClr val="tx1"/>
+                </a:solidFill>
+                <a:latin typeface="Segoe UI Light" charset="0"/>
+                <a:ea typeface="Segoe UI Light" charset="0"/>
+                <a:cs typeface="Segoe UI Light" charset="0"/>
+              </a:defRPr>
+            </a:lvl1pPr>
+            <a:lvl2pPr marL="685800" indent="-228600" algn="l" defTabSz="914400" rtl="0" eaLnBrk="1" latinLnBrk="0" hangingPunct="1">
+              <a:lnSpc>
+                <a:spcPct val="90000"/>
+              </a:lnSpc>
+              <a:spcBef>
+                <a:spcPts val="500"/>
+              </a:spcBef>
+              <a:buFont typeface="Arial"/>
+              <a:buChar char="•"/>
+              <a:defRPr sz="1800" b="0" i="0" kern="1200">
+                <a:solidFill>
+                  <a:schemeClr val="tx1"/>
+                </a:solidFill>
+                <a:latin typeface="Segoe UI Light" charset="0"/>
+                <a:ea typeface="Segoe UI Light" charset="0"/>
+                <a:cs typeface="Segoe UI Light" charset="0"/>
+              </a:defRPr>
+            </a:lvl2pPr>
+            <a:lvl3pPr marL="1143000" indent="-228600" algn="l" defTabSz="914400" rtl="0" eaLnBrk="1" latinLnBrk="0" hangingPunct="1">
+              <a:lnSpc>
+                <a:spcPct val="90000"/>
+              </a:lnSpc>
+              <a:spcBef>
+                <a:spcPts val="500"/>
+              </a:spcBef>
+              <a:buFont typeface="Arial"/>
+              <a:buChar char="•"/>
+              <a:defRPr sz="1600" b="0" i="0" kern="1200">
+                <a:solidFill>
+                  <a:schemeClr val="tx1"/>
+                </a:solidFill>
+                <a:latin typeface="Segoe UI Light" charset="0"/>
+                <a:ea typeface="Segoe UI Light" charset="0"/>
+                <a:cs typeface="Segoe UI Light" charset="0"/>
+              </a:defRPr>
+            </a:lvl3pPr>
+            <a:lvl4pPr marL="1600200" indent="-228600" algn="l" defTabSz="914400" rtl="0" eaLnBrk="1" latinLnBrk="0" hangingPunct="1">
+              <a:lnSpc>
+                <a:spcPct val="90000"/>
+              </a:lnSpc>
+              <a:spcBef>
+                <a:spcPts val="500"/>
+              </a:spcBef>
+              <a:buFont typeface="Arial"/>
+              <a:buChar char="•"/>
+              <a:defRPr sz="1400" b="0" i="0" kern="1200">
+                <a:solidFill>
+                  <a:schemeClr val="tx1"/>
+                </a:solidFill>
+                <a:latin typeface="Segoe UI Light" charset="0"/>
+                <a:ea typeface="Segoe UI Light" charset="0"/>
+                <a:cs typeface="Segoe UI Light" charset="0"/>
+              </a:defRPr>
+            </a:lvl4pPr>
+            <a:lvl5pPr marL="2057400" indent="-228600" algn="l" defTabSz="914400" rtl="0" eaLnBrk="1" latinLnBrk="0" hangingPunct="1">
+              <a:lnSpc>
+                <a:spcPct val="90000"/>
+              </a:lnSpc>
+              <a:spcBef>
+                <a:spcPts val="500"/>
+              </a:spcBef>
+              <a:buFont typeface="Arial"/>
+              <a:buChar char="•"/>
+              <a:defRPr sz="1400" b="0" i="0" kern="1200">
+                <a:solidFill>
+                  <a:schemeClr val="tx1"/>
+                </a:solidFill>
+                <a:latin typeface="Segoe UI Light" charset="0"/>
+                <a:ea typeface="Segoe UI Light" charset="0"/>
+                <a:cs typeface="Segoe UI Light" charset="0"/>
+              </a:defRPr>
+            </a:lvl5pPr>
+            <a:lvl6pPr marL="2514600" indent="-228600" algn="l" defTabSz="914400" rtl="0" eaLnBrk="1" latinLnBrk="0" hangingPunct="1">
+              <a:lnSpc>
+                <a:spcPct val="90000"/>
+              </a:lnSpc>
+              <a:spcBef>
+                <a:spcPts val="500"/>
+              </a:spcBef>
+              <a:buFont typeface="Arial"/>
+              <a:buChar char="•"/>
+              <a:defRPr sz="1800" kern="1200">
+                <a:solidFill>
+                  <a:schemeClr val="tx1"/>
+                </a:solidFill>
+                <a:latin typeface="+mn-lt"/>
+                <a:ea typeface="+mn-ea"/>
+                <a:cs typeface="+mn-cs"/>
+              </a:defRPr>
+            </a:lvl6pPr>
+            <a:lvl7pPr marL="2971800" indent="-228600" algn="l" defTabSz="914400" rtl="0" eaLnBrk="1" latinLnBrk="0" hangingPunct="1">
+              <a:lnSpc>
+                <a:spcPct val="90000"/>
+              </a:lnSpc>
+              <a:spcBef>
+                <a:spcPts val="500"/>
+              </a:spcBef>
+              <a:buFont typeface="Arial"/>
+              <a:buChar char="•"/>
+              <a:defRPr sz="1800" kern="1200">
+                <a:solidFill>
+                  <a:schemeClr val="tx1"/>
+                </a:solidFill>
+                <a:latin typeface="+mn-lt"/>
+                <a:ea typeface="+mn-ea"/>
+                <a:cs typeface="+mn-cs"/>
+              </a:defRPr>
+            </a:lvl7pPr>
+            <a:lvl8pPr marL="3429000" indent="-228600" algn="l" defTabSz="914400" rtl="0" eaLnBrk="1" latinLnBrk="0" hangingPunct="1">
+              <a:lnSpc>
+                <a:spcPct val="90000"/>
+              </a:lnSpc>
+              <a:spcBef>
+                <a:spcPts val="500"/>
+              </a:spcBef>
+              <a:buFont typeface="Arial"/>
+              <a:buChar char="•"/>
+              <a:defRPr sz="1800" kern="1200">
+                <a:solidFill>
+                  <a:schemeClr val="tx1"/>
+                </a:solidFill>
+                <a:latin typeface="+mn-lt"/>
+                <a:ea typeface="+mn-ea"/>
+                <a:cs typeface="+mn-cs"/>
+              </a:defRPr>
+            </a:lvl8pPr>
+            <a:lvl9pPr marL="3886200" indent="-228600" algn="l" defTabSz="914400" rtl="0" eaLnBrk="1" latinLnBrk="0" hangingPunct="1">
+              <a:lnSpc>
+                <a:spcPct val="90000"/>
+              </a:lnSpc>
+              <a:spcBef>
+                <a:spcPts val="500"/>
+              </a:spcBef>
+              <a:buFont typeface="Arial"/>
+              <a:buChar char="•"/>
+              <a:defRPr sz="1800" kern="1200">
+                <a:solidFill>
+                  <a:schemeClr val="tx1"/>
+                </a:solidFill>
+                <a:latin typeface="+mn-lt"/>
+                <a:ea typeface="+mn-ea"/>
+                <a:cs typeface="+mn-cs"/>
+              </a:defRPr>
+            </a:lvl9pPr>
+          </a:lstStyle>
+          <a:p>
+            <a:r>
+              <a:rPr lang="pt-BR" b="1" dirty="0" smtClean="0">
+                <a:latin typeface="Segoe UI" panose="020B0502040204020203" pitchFamily="34" charset="0"/>
+                <a:cs typeface="Segoe UI" panose="020B0502040204020203" pitchFamily="34" charset="0"/>
+              </a:rPr>
+              <a:t>Requisição POST:</a:t>
+            </a:r>
+            <a:endParaRPr lang="pt-BR" b="1" dirty="0" smtClean="0">
+              <a:latin typeface="Segoe UI" panose="020B0502040204020203" pitchFamily="34" charset="0"/>
+              <a:cs typeface="Segoe UI" panose="020B0502040204020203" pitchFamily="34" charset="0"/>
+            </a:endParaRPr>
+          </a:p>
+        </p:txBody>
+      </p:sp>
+      <p:sp>
+        <p:nvSpPr>
+          <p:cNvPr id="11" name="Content Placeholder 6"/>
+          <p:cNvSpPr txBox="1">
+            <a:spLocks/>
+          </p:cNvSpPr>
+          <p:nvPr/>
+        </p:nvSpPr>
+        <p:spPr>
+          <a:xfrm>
+            <a:off x="5675850" y="2485017"/>
+            <a:ext cx="4576514" cy="1007636"/>
+          </a:xfrm>
+          <a:prstGeom prst="rect">
+            <a:avLst/>
+          </a:prstGeom>
+        </p:spPr>
+        <p:txBody>
+          <a:bodyPr vert="horz" lIns="91440" tIns="45720" rIns="91440" bIns="45720" rtlCol="0">
+            <a:noAutofit/>
+          </a:bodyPr>
+          <a:lstStyle>
+            <a:lvl1pPr marL="0" indent="0" algn="l" defTabSz="914400" rtl="0" eaLnBrk="1" latinLnBrk="0" hangingPunct="1">
+              <a:lnSpc>
+                <a:spcPct val="90000"/>
+              </a:lnSpc>
+              <a:spcBef>
+                <a:spcPts val="1000"/>
+              </a:spcBef>
+              <a:buFont typeface="Arial"/>
+              <a:buNone/>
+              <a:defRPr sz="2000" b="0" i="0" kern="1200">
+                <a:solidFill>
+                  <a:schemeClr val="tx1"/>
+                </a:solidFill>
+                <a:latin typeface="Segoe UI Light" charset="0"/>
+                <a:ea typeface="Segoe UI Light" charset="0"/>
+                <a:cs typeface="Segoe UI Light" charset="0"/>
+              </a:defRPr>
+            </a:lvl1pPr>
+            <a:lvl2pPr marL="685800" indent="-228600" algn="l" defTabSz="914400" rtl="0" eaLnBrk="1" latinLnBrk="0" hangingPunct="1">
+              <a:lnSpc>
+                <a:spcPct val="90000"/>
+              </a:lnSpc>
+              <a:spcBef>
+                <a:spcPts val="500"/>
+              </a:spcBef>
+              <a:buFont typeface="Arial"/>
+              <a:buChar char="•"/>
+              <a:defRPr sz="1800" b="0" i="0" kern="1200">
+                <a:solidFill>
+                  <a:schemeClr val="tx1"/>
+                </a:solidFill>
+                <a:latin typeface="Segoe UI Light" charset="0"/>
+                <a:ea typeface="Segoe UI Light" charset="0"/>
+                <a:cs typeface="Segoe UI Light" charset="0"/>
+              </a:defRPr>
+            </a:lvl2pPr>
+            <a:lvl3pPr marL="1143000" indent="-228600" algn="l" defTabSz="914400" rtl="0" eaLnBrk="1" latinLnBrk="0" hangingPunct="1">
+              <a:lnSpc>
+                <a:spcPct val="90000"/>
+              </a:lnSpc>
+              <a:spcBef>
+                <a:spcPts val="500"/>
+              </a:spcBef>
+              <a:buFont typeface="Arial"/>
+              <a:buChar char="•"/>
+              <a:defRPr sz="1600" b="0" i="0" kern="1200">
+                <a:solidFill>
+                  <a:schemeClr val="tx1"/>
+                </a:solidFill>
+                <a:latin typeface="Segoe UI Light" charset="0"/>
+                <a:ea typeface="Segoe UI Light" charset="0"/>
+                <a:cs typeface="Segoe UI Light" charset="0"/>
+              </a:defRPr>
+            </a:lvl3pPr>
+            <a:lvl4pPr marL="1600200" indent="-228600" algn="l" defTabSz="914400" rtl="0" eaLnBrk="1" latinLnBrk="0" hangingPunct="1">
+              <a:lnSpc>
+                <a:spcPct val="90000"/>
+              </a:lnSpc>
+              <a:spcBef>
+                <a:spcPts val="500"/>
+              </a:spcBef>
+              <a:buFont typeface="Arial"/>
+              <a:buChar char="•"/>
+              <a:defRPr sz="1400" b="0" i="0" kern="1200">
+                <a:solidFill>
+                  <a:schemeClr val="tx1"/>
+                </a:solidFill>
+                <a:latin typeface="Segoe UI Light" charset="0"/>
+                <a:ea typeface="Segoe UI Light" charset="0"/>
+                <a:cs typeface="Segoe UI Light" charset="0"/>
+              </a:defRPr>
+            </a:lvl4pPr>
+            <a:lvl5pPr marL="2057400" indent="-228600" algn="l" defTabSz="914400" rtl="0" eaLnBrk="1" latinLnBrk="0" hangingPunct="1">
+              <a:lnSpc>
+                <a:spcPct val="90000"/>
+              </a:lnSpc>
+              <a:spcBef>
+                <a:spcPts val="500"/>
+              </a:spcBef>
+              <a:buFont typeface="Arial"/>
+              <a:buChar char="•"/>
+              <a:defRPr sz="1400" b="0" i="0" kern="1200">
+                <a:solidFill>
+                  <a:schemeClr val="tx1"/>
+                </a:solidFill>
+                <a:latin typeface="Segoe UI Light" charset="0"/>
+                <a:ea typeface="Segoe UI Light" charset="0"/>
+                <a:cs typeface="Segoe UI Light" charset="0"/>
+              </a:defRPr>
+            </a:lvl5pPr>
+            <a:lvl6pPr marL="2514600" indent="-228600" algn="l" defTabSz="914400" rtl="0" eaLnBrk="1" latinLnBrk="0" hangingPunct="1">
+              <a:lnSpc>
+                <a:spcPct val="90000"/>
+              </a:lnSpc>
+              <a:spcBef>
+                <a:spcPts val="500"/>
+              </a:spcBef>
+              <a:buFont typeface="Arial"/>
+              <a:buChar char="•"/>
+              <a:defRPr sz="1800" kern="1200">
+                <a:solidFill>
+                  <a:schemeClr val="tx1"/>
+                </a:solidFill>
+                <a:latin typeface="+mn-lt"/>
+                <a:ea typeface="+mn-ea"/>
+                <a:cs typeface="+mn-cs"/>
+              </a:defRPr>
+            </a:lvl6pPr>
+            <a:lvl7pPr marL="2971800" indent="-228600" algn="l" defTabSz="914400" rtl="0" eaLnBrk="1" latinLnBrk="0" hangingPunct="1">
+              <a:lnSpc>
+                <a:spcPct val="90000"/>
+              </a:lnSpc>
+              <a:spcBef>
+                <a:spcPts val="500"/>
+              </a:spcBef>
+              <a:buFont typeface="Arial"/>
+              <a:buChar char="•"/>
+              <a:defRPr sz="1800" kern="1200">
+                <a:solidFill>
+                  <a:schemeClr val="tx1"/>
+                </a:solidFill>
+                <a:latin typeface="+mn-lt"/>
+                <a:ea typeface="+mn-ea"/>
+                <a:cs typeface="+mn-cs"/>
+              </a:defRPr>
+            </a:lvl7pPr>
+            <a:lvl8pPr marL="3429000" indent="-228600" algn="l" defTabSz="914400" rtl="0" eaLnBrk="1" latinLnBrk="0" hangingPunct="1">
+              <a:lnSpc>
+                <a:spcPct val="90000"/>
+              </a:lnSpc>
+              <a:spcBef>
+                <a:spcPts val="500"/>
+              </a:spcBef>
+              <a:buFont typeface="Arial"/>
+              <a:buChar char="•"/>
+              <a:defRPr sz="1800" kern="1200">
+                <a:solidFill>
+                  <a:schemeClr val="tx1"/>
+                </a:solidFill>
+                <a:latin typeface="+mn-lt"/>
+                <a:ea typeface="+mn-ea"/>
+                <a:cs typeface="+mn-cs"/>
+              </a:defRPr>
+            </a:lvl8pPr>
+            <a:lvl9pPr marL="3886200" indent="-228600" algn="l" defTabSz="914400" rtl="0" eaLnBrk="1" latinLnBrk="0" hangingPunct="1">
+              <a:lnSpc>
+                <a:spcPct val="90000"/>
+              </a:lnSpc>
+              <a:spcBef>
+                <a:spcPts val="500"/>
+              </a:spcBef>
+              <a:buFont typeface="Arial"/>
+              <a:buChar char="•"/>
+              <a:defRPr sz="1800" kern="1200">
+                <a:solidFill>
+                  <a:schemeClr val="tx1"/>
+                </a:solidFill>
+                <a:latin typeface="+mn-lt"/>
+                <a:ea typeface="+mn-ea"/>
+                <a:cs typeface="+mn-cs"/>
+              </a:defRPr>
+            </a:lvl9pPr>
+          </a:lstStyle>
+          <a:p>
+            <a:r>
+              <a:rPr lang="pt-BR" b="1" dirty="0" smtClean="0">
+                <a:latin typeface="Segoe UI" panose="020B0502040204020203" pitchFamily="34" charset="0"/>
+                <a:cs typeface="Segoe UI" panose="020B0502040204020203" pitchFamily="34" charset="0"/>
+              </a:rPr>
+              <a:t>O verbo DELETE é nesse mesmo formato, precisando apenas da URL, sem dados no corpo da requisição.</a:t>
+            </a:r>
+            <a:endParaRPr lang="pt-BR" b="1" dirty="0" smtClean="0">
+              <a:latin typeface="Segoe UI" panose="020B0502040204020203" pitchFamily="34" charset="0"/>
+              <a:cs typeface="Segoe UI" panose="020B0502040204020203" pitchFamily="34" charset="0"/>
+            </a:endParaRPr>
+          </a:p>
+        </p:txBody>
+      </p:sp>
+      <p:sp>
+        <p:nvSpPr>
+          <p:cNvPr id="12" name="Content Placeholder 6"/>
+          <p:cNvSpPr txBox="1">
+            <a:spLocks/>
+          </p:cNvSpPr>
+          <p:nvPr/>
+        </p:nvSpPr>
+        <p:spPr>
+          <a:xfrm>
+            <a:off x="7703126" y="3902799"/>
+            <a:ext cx="4271714" cy="1007636"/>
+          </a:xfrm>
+          <a:prstGeom prst="rect">
+            <a:avLst/>
+          </a:prstGeom>
+        </p:spPr>
+        <p:txBody>
+          <a:bodyPr vert="horz" lIns="91440" tIns="45720" rIns="91440" bIns="45720" rtlCol="0">
+            <a:noAutofit/>
+          </a:bodyPr>
+          <a:lstStyle>
+            <a:lvl1pPr marL="0" indent="0" algn="l" defTabSz="914400" rtl="0" eaLnBrk="1" latinLnBrk="0" hangingPunct="1">
+              <a:lnSpc>
+                <a:spcPct val="90000"/>
+              </a:lnSpc>
+              <a:spcBef>
+                <a:spcPts val="1000"/>
+              </a:spcBef>
+              <a:buFont typeface="Arial"/>
+              <a:buNone/>
+              <a:defRPr sz="2000" b="0" i="0" kern="1200">
+                <a:solidFill>
+                  <a:schemeClr val="tx1"/>
+                </a:solidFill>
+                <a:latin typeface="Segoe UI Light" charset="0"/>
+                <a:ea typeface="Segoe UI Light" charset="0"/>
+                <a:cs typeface="Segoe UI Light" charset="0"/>
+              </a:defRPr>
+            </a:lvl1pPr>
+            <a:lvl2pPr marL="685800" indent="-228600" algn="l" defTabSz="914400" rtl="0" eaLnBrk="1" latinLnBrk="0" hangingPunct="1">
+              <a:lnSpc>
+                <a:spcPct val="90000"/>
+              </a:lnSpc>
+              <a:spcBef>
+                <a:spcPts val="500"/>
+              </a:spcBef>
+              <a:buFont typeface="Arial"/>
+              <a:buChar char="•"/>
+              <a:defRPr sz="1800" b="0" i="0" kern="1200">
+                <a:solidFill>
+                  <a:schemeClr val="tx1"/>
+                </a:solidFill>
+                <a:latin typeface="Segoe UI Light" charset="0"/>
+                <a:ea typeface="Segoe UI Light" charset="0"/>
+                <a:cs typeface="Segoe UI Light" charset="0"/>
+              </a:defRPr>
+            </a:lvl2pPr>
+            <a:lvl3pPr marL="1143000" indent="-228600" algn="l" defTabSz="914400" rtl="0" eaLnBrk="1" latinLnBrk="0" hangingPunct="1">
+              <a:lnSpc>
+                <a:spcPct val="90000"/>
+              </a:lnSpc>
+              <a:spcBef>
+                <a:spcPts val="500"/>
+              </a:spcBef>
+              <a:buFont typeface="Arial"/>
+              <a:buChar char="•"/>
+              <a:defRPr sz="1600" b="0" i="0" kern="1200">
+                <a:solidFill>
+                  <a:schemeClr val="tx1"/>
+                </a:solidFill>
+                <a:latin typeface="Segoe UI Light" charset="0"/>
+                <a:ea typeface="Segoe UI Light" charset="0"/>
+                <a:cs typeface="Segoe UI Light" charset="0"/>
+              </a:defRPr>
+            </a:lvl3pPr>
+            <a:lvl4pPr marL="1600200" indent="-228600" algn="l" defTabSz="914400" rtl="0" eaLnBrk="1" latinLnBrk="0" hangingPunct="1">
+              <a:lnSpc>
+                <a:spcPct val="90000"/>
+              </a:lnSpc>
+              <a:spcBef>
+                <a:spcPts val="500"/>
+              </a:spcBef>
+              <a:buFont typeface="Arial"/>
+              <a:buChar char="•"/>
+              <a:defRPr sz="1400" b="0" i="0" kern="1200">
+                <a:solidFill>
+                  <a:schemeClr val="tx1"/>
+                </a:solidFill>
+                <a:latin typeface="Segoe UI Light" charset="0"/>
+                <a:ea typeface="Segoe UI Light" charset="0"/>
+                <a:cs typeface="Segoe UI Light" charset="0"/>
+              </a:defRPr>
+            </a:lvl4pPr>
+            <a:lvl5pPr marL="2057400" indent="-228600" algn="l" defTabSz="914400" rtl="0" eaLnBrk="1" latinLnBrk="0" hangingPunct="1">
+              <a:lnSpc>
+                <a:spcPct val="90000"/>
+              </a:lnSpc>
+              <a:spcBef>
+                <a:spcPts val="500"/>
+              </a:spcBef>
+              <a:buFont typeface="Arial"/>
+              <a:buChar char="•"/>
+              <a:defRPr sz="1400" b="0" i="0" kern="1200">
+                <a:solidFill>
+                  <a:schemeClr val="tx1"/>
+                </a:solidFill>
+                <a:latin typeface="Segoe UI Light" charset="0"/>
+                <a:ea typeface="Segoe UI Light" charset="0"/>
+                <a:cs typeface="Segoe UI Light" charset="0"/>
+              </a:defRPr>
+            </a:lvl5pPr>
+            <a:lvl6pPr marL="2514600" indent="-228600" algn="l" defTabSz="914400" rtl="0" eaLnBrk="1" latinLnBrk="0" hangingPunct="1">
+              <a:lnSpc>
+                <a:spcPct val="90000"/>
+              </a:lnSpc>
+              <a:spcBef>
+                <a:spcPts val="500"/>
+              </a:spcBef>
+              <a:buFont typeface="Arial"/>
+              <a:buChar char="•"/>
+              <a:defRPr sz="1800" kern="1200">
+                <a:solidFill>
+                  <a:schemeClr val="tx1"/>
+                </a:solidFill>
+                <a:latin typeface="+mn-lt"/>
+                <a:ea typeface="+mn-ea"/>
+                <a:cs typeface="+mn-cs"/>
+              </a:defRPr>
+            </a:lvl6pPr>
+            <a:lvl7pPr marL="2971800" indent="-228600" algn="l" defTabSz="914400" rtl="0" eaLnBrk="1" latinLnBrk="0" hangingPunct="1">
+              <a:lnSpc>
+                <a:spcPct val="90000"/>
+              </a:lnSpc>
+              <a:spcBef>
+                <a:spcPts val="500"/>
+              </a:spcBef>
+              <a:buFont typeface="Arial"/>
+              <a:buChar char="•"/>
+              <a:defRPr sz="1800" kern="1200">
+                <a:solidFill>
+                  <a:schemeClr val="tx1"/>
+                </a:solidFill>
+                <a:latin typeface="+mn-lt"/>
+                <a:ea typeface="+mn-ea"/>
+                <a:cs typeface="+mn-cs"/>
+              </a:defRPr>
+            </a:lvl7pPr>
+            <a:lvl8pPr marL="3429000" indent="-228600" algn="l" defTabSz="914400" rtl="0" eaLnBrk="1" latinLnBrk="0" hangingPunct="1">
+              <a:lnSpc>
+                <a:spcPct val="90000"/>
+              </a:lnSpc>
+              <a:spcBef>
+                <a:spcPts val="500"/>
+              </a:spcBef>
+              <a:buFont typeface="Arial"/>
+              <a:buChar char="•"/>
+              <a:defRPr sz="1800" kern="1200">
+                <a:solidFill>
+                  <a:schemeClr val="tx1"/>
+                </a:solidFill>
+                <a:latin typeface="+mn-lt"/>
+                <a:ea typeface="+mn-ea"/>
+                <a:cs typeface="+mn-cs"/>
+              </a:defRPr>
+            </a:lvl8pPr>
+            <a:lvl9pPr marL="3886200" indent="-228600" algn="l" defTabSz="914400" rtl="0" eaLnBrk="1" latinLnBrk="0" hangingPunct="1">
+              <a:lnSpc>
+                <a:spcPct val="90000"/>
+              </a:lnSpc>
+              <a:spcBef>
+                <a:spcPts val="500"/>
+              </a:spcBef>
+              <a:buFont typeface="Arial"/>
+              <a:buChar char="•"/>
+              <a:defRPr sz="1800" kern="1200">
+                <a:solidFill>
+                  <a:schemeClr val="tx1"/>
+                </a:solidFill>
+                <a:latin typeface="+mn-lt"/>
+                <a:ea typeface="+mn-ea"/>
+                <a:cs typeface="+mn-cs"/>
+              </a:defRPr>
+            </a:lvl9pPr>
+          </a:lstStyle>
+          <a:p>
+            <a:r>
+              <a:rPr lang="pt-BR" b="1" dirty="0" smtClean="0">
+                <a:latin typeface="Segoe UI" panose="020B0502040204020203" pitchFamily="34" charset="0"/>
+                <a:cs typeface="Segoe UI" panose="020B0502040204020203" pitchFamily="34" charset="0"/>
+              </a:rPr>
+              <a:t>O verbo PUT é nesse mesmo formato, podendo informar a URL e dados do corpo da requisição.</a:t>
+            </a:r>
+            <a:endParaRPr lang="pt-BR" b="1" dirty="0" smtClean="0">
+              <a:latin typeface="Segoe UI" panose="020B0502040204020203" pitchFamily="34" charset="0"/>
+              <a:cs typeface="Segoe UI" panose="020B0502040204020203" pitchFamily="34" charset="0"/>
+            </a:endParaRPr>
+          </a:p>
+        </p:txBody>
+      </p:sp>
+    </p:spTree>
+    <p:extLst>
+      <p:ext uri="{BB962C8B-B14F-4D97-AF65-F5344CB8AC3E}">
+        <p14:creationId xmlns:p14="http://schemas.microsoft.com/office/powerpoint/2010/main" val="493947930"/>
+      </p:ext>
+    </p:extLst>
+  </p:cSld>
+  <p:clrMapOvr>
+    <a:masterClrMapping/>
+  </p:clrMapOvr>
+  <p:transition>
+    <p:fade/>
+  </p:transition>
+  <p:timing>
+    <p:tnLst>
+      <p:par>
+        <p:cTn id="1" dur="indefinite" restart="never" nodeType="tmRoot"/>
+      </p:par>
+    </p:tnLst>
+  </p:timing>
+</p:sld>
+</file>
+
+<file path=ppt/slides/slide13.xml><?xml version="1.0" encoding="utf-8"?>
+<p:sld xmlns:a="http://schemas.openxmlformats.org/drawingml/2006/main" xmlns:r="http://schemas.openxmlformats.org/officeDocument/2006/relationships" xmlns:p="http://schemas.openxmlformats.org/presentationml/2006/main">
+  <p:cSld>
+    <p:spTree>
+      <p:nvGrpSpPr>
+        <p:cNvPr id="1" name=""/>
+        <p:cNvGrpSpPr/>
+        <p:nvPr/>
+      </p:nvGrpSpPr>
+      <p:grpSpPr>
+        <a:xfrm>
+          <a:off x="0" y="0"/>
+          <a:ext cx="0" cy="0"/>
+          <a:chOff x="0" y="0"/>
+          <a:chExt cx="0" cy="0"/>
+        </a:xfrm>
+      </p:grpSpPr>
+      <p:sp>
+        <p:nvSpPr>
+          <p:cNvPr id="7" name="Content Placeholder 6"/>
+          <p:cNvSpPr>
+            <a:spLocks noGrp="1"/>
+          </p:cNvSpPr>
+          <p:nvPr>
+            <p:ph idx="1"/>
+          </p:nvPr>
+        </p:nvSpPr>
+        <p:spPr>
+          <a:xfrm>
+            <a:off x="960792" y="1524000"/>
+            <a:ext cx="10270415" cy="4470400"/>
+          </a:xfrm>
+        </p:spPr>
+        <p:txBody>
+          <a:bodyPr/>
+          <a:lstStyle/>
+          <a:p>
+            <a:r>
+              <a:rPr lang="pt-BR" dirty="0" smtClean="0"/>
+              <a:t>O que estes métodos do serviço </a:t>
+            </a:r>
+            <a:r>
+              <a:rPr lang="pt-BR" dirty="0" err="1" smtClean="0"/>
+              <a:t>HttpClient</a:t>
+            </a:r>
+            <a:r>
+              <a:rPr lang="pt-BR" dirty="0" smtClean="0"/>
+              <a:t> retornam?</a:t>
+            </a:r>
+          </a:p>
+          <a:p>
+            <a:endParaRPr lang="pt-BR" dirty="0"/>
+          </a:p>
+          <a:p>
+            <a:r>
+              <a:rPr lang="pt-BR" dirty="0" smtClean="0"/>
+              <a:t>Ele retornam um </a:t>
+            </a:r>
+            <a:r>
+              <a:rPr lang="pt-BR" dirty="0" err="1" smtClean="0"/>
+              <a:t>Observable</a:t>
+            </a:r>
+            <a:r>
+              <a:rPr lang="pt-BR" smtClean="0"/>
+              <a:t>.</a:t>
+            </a:r>
+            <a:endParaRPr lang="pt-BR" dirty="0" smtClean="0"/>
+          </a:p>
+        </p:txBody>
+      </p:sp>
+      <p:sp>
+        <p:nvSpPr>
+          <p:cNvPr id="6" name="Title 5"/>
+          <p:cNvSpPr>
+            <a:spLocks noGrp="1"/>
+          </p:cNvSpPr>
+          <p:nvPr>
+            <p:ph type="title"/>
+          </p:nvPr>
+        </p:nvSpPr>
+        <p:spPr/>
+        <p:txBody>
+          <a:bodyPr/>
+          <a:lstStyle/>
+          <a:p>
+            <a:r>
+              <a:rPr lang="en-US" dirty="0" smtClean="0"/>
+              <a:t>A </a:t>
+            </a:r>
+            <a:r>
+              <a:rPr lang="en-US" dirty="0" err="1" smtClean="0"/>
+              <a:t>classe</a:t>
+            </a:r>
+            <a:r>
+              <a:rPr lang="en-US" dirty="0" smtClean="0"/>
+              <a:t> </a:t>
+            </a:r>
+            <a:r>
+              <a:rPr lang="en-US" dirty="0" err="1" smtClean="0"/>
+              <a:t>HttpClient</a:t>
+            </a:r>
+            <a:r>
+              <a:rPr lang="en-US" dirty="0" smtClean="0"/>
+              <a:t> do Angular</a:t>
+            </a:r>
+            <a:endParaRPr lang="en-US" dirty="0"/>
+          </a:p>
+        </p:txBody>
+      </p:sp>
+    </p:spTree>
+    <p:extLst>
+      <p:ext uri="{BB962C8B-B14F-4D97-AF65-F5344CB8AC3E}">
+        <p14:creationId xmlns:p14="http://schemas.microsoft.com/office/powerpoint/2010/main" val="290438184"/>
+      </p:ext>
+    </p:extLst>
+  </p:cSld>
+  <p:clrMapOvr>
+    <a:masterClrMapping/>
+  </p:clrMapOvr>
+  <p:transition>
+    <p:fade/>
+  </p:transition>
+  <p:timing>
+    <p:tnLst>
+      <p:par>
+        <p:cTn id="1" dur="indefinite" restart="never" nodeType="tmRoot"/>
+      </p:par>
+    </p:tnLst>
+  </p:timing>
+</p:sld>
+</file>
+
+<file path=ppt/slides/slide14.xml><?xml version="1.0" encoding="utf-8"?>
+<p:sld xmlns:a="http://schemas.openxmlformats.org/drawingml/2006/main" xmlns:r="http://schemas.openxmlformats.org/officeDocument/2006/relationships" xmlns:p="http://schemas.openxmlformats.org/presentationml/2006/main">
+  <p:cSld>
+    <p:spTree>
+      <p:nvGrpSpPr>
+        <p:cNvPr id="1" name=""/>
+        <p:cNvGrpSpPr/>
+        <p:nvPr/>
+      </p:nvGrpSpPr>
+      <p:grpSpPr>
+        <a:xfrm>
+          <a:off x="0" y="0"/>
+          <a:ext cx="0" cy="0"/>
+          <a:chOff x="0" y="0"/>
+          <a:chExt cx="0" cy="0"/>
+        </a:xfrm>
+      </p:grpSpPr>
+      <p:sp>
+        <p:nvSpPr>
+          <p:cNvPr id="7" name="Content Placeholder 6"/>
+          <p:cNvSpPr>
+            <a:spLocks noGrp="1"/>
+          </p:cNvSpPr>
+          <p:nvPr>
+            <p:ph idx="1"/>
+          </p:nvPr>
+        </p:nvSpPr>
+        <p:spPr>
+          <a:xfrm>
+            <a:off x="960792" y="1524000"/>
             <a:ext cx="10270415" cy="658761"/>
           </a:xfrm>
         </p:spPr>
@@ -9888,7 +11355,7 @@
 </p:sld>
 </file>
 
-<file path=ppt/slides/slide13.xml><?xml version="1.0" encoding="utf-8"?>
+<file path=ppt/slides/slide15.xml><?xml version="1.0" encoding="utf-8"?>
 <p:sld xmlns:a="http://schemas.openxmlformats.org/drawingml/2006/main" xmlns:r="http://schemas.openxmlformats.org/officeDocument/2006/relationships" xmlns:p="http://schemas.openxmlformats.org/presentationml/2006/main">
   <p:cSld>
     <p:spTree>
@@ -11138,7 +12605,7 @@
 </p:sld>
 </file>
 
-<file path=ppt/slides/slide14.xml><?xml version="1.0" encoding="utf-8"?>
+<file path=ppt/slides/slide16.xml><?xml version="1.0" encoding="utf-8"?>
 <p:sld xmlns:a="http://schemas.openxmlformats.org/drawingml/2006/main" xmlns:r="http://schemas.openxmlformats.org/officeDocument/2006/relationships" xmlns:p="http://schemas.openxmlformats.org/presentationml/2006/main">
   <p:cSld>
     <p:spTree>
@@ -11236,7 +12703,7 @@
 </p:sld>
 </file>
 
-<file path=ppt/slides/slide15.xml><?xml version="1.0" encoding="utf-8"?>
+<file path=ppt/slides/slide17.xml><?xml version="1.0" encoding="utf-8"?>
 <p:sld xmlns:a="http://schemas.openxmlformats.org/drawingml/2006/main" xmlns:r="http://schemas.openxmlformats.org/officeDocument/2006/relationships" xmlns:p="http://schemas.openxmlformats.org/presentationml/2006/main">
   <p:cSld>
     <p:spTree>
@@ -11483,7 +12950,7 @@
 </p:sld>
 </file>
 
-<file path=ppt/slides/slide16.xml><?xml version="1.0" encoding="utf-8"?>
+<file path=ppt/slides/slide18.xml><?xml version="1.0" encoding="utf-8"?>
 <p:sld xmlns:a="http://schemas.openxmlformats.org/drawingml/2006/main" xmlns:r="http://schemas.openxmlformats.org/officeDocument/2006/relationships" xmlns:p="http://schemas.openxmlformats.org/presentationml/2006/main">
   <p:cSld>
     <p:spTree>
@@ -13114,7 +14581,7 @@
 </p:sld>
 </file>
 
-<file path=ppt/slides/slide17.xml><?xml version="1.0" encoding="utf-8"?>
+<file path=ppt/slides/slide19.xml><?xml version="1.0" encoding="utf-8"?>
 <p:sld xmlns:a="http://schemas.openxmlformats.org/drawingml/2006/main" xmlns:r="http://schemas.openxmlformats.org/officeDocument/2006/relationships" xmlns:p="http://schemas.openxmlformats.org/presentationml/2006/main">
   <p:cSld>
     <p:spTree>
@@ -14579,7 +16046,97 @@
 </p:sld>
 </file>
 
-<file path=ppt/slides/slide18.xml><?xml version="1.0" encoding="utf-8"?>
+<file path=ppt/slides/slide2.xml><?xml version="1.0" encoding="utf-8"?>
+<p:sld xmlns:a="http://schemas.openxmlformats.org/drawingml/2006/main" xmlns:r="http://schemas.openxmlformats.org/officeDocument/2006/relationships" xmlns:p="http://schemas.openxmlformats.org/presentationml/2006/main">
+  <p:cSld>
+    <p:spTree>
+      <p:nvGrpSpPr>
+        <p:cNvPr id="1" name=""/>
+        <p:cNvGrpSpPr/>
+        <p:nvPr/>
+      </p:nvGrpSpPr>
+      <p:grpSpPr>
+        <a:xfrm>
+          <a:off x="0" y="0"/>
+          <a:ext cx="0" cy="0"/>
+          <a:chOff x="0" y="0"/>
+          <a:chExt cx="0" cy="0"/>
+        </a:xfrm>
+      </p:grpSpPr>
+      <p:sp>
+        <p:nvSpPr>
+          <p:cNvPr id="4" name="Text Placeholder 3"/>
+          <p:cNvSpPr>
+            <a:spLocks noGrp="1"/>
+          </p:cNvSpPr>
+          <p:nvPr>
+            <p:ph type="body" sz="quarter" idx="10"/>
+          </p:nvPr>
+        </p:nvSpPr>
+        <p:spPr/>
+        <p:txBody>
+          <a:bodyPr/>
+          <a:lstStyle/>
+          <a:p>
+            <a:r>
+              <a:rPr lang="pt-BR" dirty="0" smtClean="0"/>
+              <a:t>Anatomia Avançada </a:t>
+            </a:r>
+            <a:r>
+              <a:rPr lang="en-US" dirty="0" smtClean="0"/>
+              <a:t>– </a:t>
+            </a:r>
+            <a:r>
+              <a:rPr lang="en-US" dirty="0" err="1" smtClean="0"/>
+              <a:t>Serviços</a:t>
+            </a:r>
+            <a:endParaRPr lang="en-US" dirty="0"/>
+          </a:p>
+        </p:txBody>
+      </p:sp>
+      <p:sp>
+        <p:nvSpPr>
+          <p:cNvPr id="2" name="Text Placeholder 1"/>
+          <p:cNvSpPr>
+            <a:spLocks noGrp="1"/>
+          </p:cNvSpPr>
+          <p:nvPr>
+            <p:ph type="body" sz="quarter" idx="11"/>
+          </p:nvPr>
+        </p:nvSpPr>
+        <p:spPr/>
+        <p:txBody>
+          <a:bodyPr/>
+          <a:lstStyle/>
+          <a:p>
+            <a:endParaRPr lang="en-US" dirty="0"/>
+          </a:p>
+        </p:txBody>
+      </p:sp>
+    </p:spTree>
+    <p:extLst>
+      <p:ext uri="{BB962C8B-B14F-4D97-AF65-F5344CB8AC3E}">
+        <p14:creationId xmlns:p14="http://schemas.microsoft.com/office/powerpoint/2010/main" val="3411408423"/>
+      </p:ext>
+    </p:extLst>
+  </p:cSld>
+  <p:clrMapOvr>
+    <a:masterClrMapping/>
+  </p:clrMapOvr>
+  <p:transition>
+    <p:fade/>
+  </p:transition>
+  <p:timing>
+    <p:tnLst>
+      <p:par>
+        <p:cTn id="1" dur="indefinite" restart="never" nodeType="tmRoot"/>
+      </p:par>
+    </p:tnLst>
+  </p:timing>
+</p:sld>
+</file>
+
+<file path=ppt/slides/slide20.xml><?xml version="1.0" encoding="utf-8"?>
 <p:sld xmlns:a="http://schemas.openxmlformats.org/drawingml/2006/main" xmlns:r="http://schemas.openxmlformats.org/officeDocument/2006/relationships" xmlns:p="http://schemas.openxmlformats.org/presentationml/2006/main">
   <p:cSld>
     <p:spTree>
@@ -14698,7 +16255,7 @@
 </p:sld>
 </file>
 
-<file path=ppt/slides/slide19.xml><?xml version="1.0" encoding="utf-8"?>
+<file path=ppt/slides/slide21.xml><?xml version="1.0" encoding="utf-8"?>
 <p:sld xmlns:a="http://schemas.openxmlformats.org/drawingml/2006/main" xmlns:r="http://schemas.openxmlformats.org/officeDocument/2006/relationships" xmlns:p="http://schemas.openxmlformats.org/presentationml/2006/main">
   <p:cSld>
     <p:spTree>
@@ -15266,97 +16823,7 @@
 </p:sld>
 </file>
 
-<file path=ppt/slides/slide2.xml><?xml version="1.0" encoding="utf-8"?>
-<p:sld xmlns:a="http://schemas.openxmlformats.org/drawingml/2006/main" xmlns:r="http://schemas.openxmlformats.org/officeDocument/2006/relationships" xmlns:p="http://schemas.openxmlformats.org/presentationml/2006/main">
-  <p:cSld>
-    <p:spTree>
-      <p:nvGrpSpPr>
-        <p:cNvPr id="1" name=""/>
-        <p:cNvGrpSpPr/>
-        <p:nvPr/>
-      </p:nvGrpSpPr>
-      <p:grpSpPr>
-        <a:xfrm>
-          <a:off x="0" y="0"/>
-          <a:ext cx="0" cy="0"/>
-          <a:chOff x="0" y="0"/>
-          <a:chExt cx="0" cy="0"/>
-        </a:xfrm>
-      </p:grpSpPr>
-      <p:sp>
-        <p:nvSpPr>
-          <p:cNvPr id="4" name="Text Placeholder 3"/>
-          <p:cNvSpPr>
-            <a:spLocks noGrp="1"/>
-          </p:cNvSpPr>
-          <p:nvPr>
-            <p:ph type="body" sz="quarter" idx="10"/>
-          </p:nvPr>
-        </p:nvSpPr>
-        <p:spPr/>
-        <p:txBody>
-          <a:bodyPr/>
-          <a:lstStyle/>
-          <a:p>
-            <a:r>
-              <a:rPr lang="pt-BR" dirty="0" smtClean="0"/>
-              <a:t>Anatomia Avançada </a:t>
-            </a:r>
-            <a:r>
-              <a:rPr lang="en-US" dirty="0" smtClean="0"/>
-              <a:t>– </a:t>
-            </a:r>
-            <a:r>
-              <a:rPr lang="en-US" dirty="0" err="1" smtClean="0"/>
-              <a:t>Serviços</a:t>
-            </a:r>
-            <a:endParaRPr lang="en-US" dirty="0"/>
-          </a:p>
-        </p:txBody>
-      </p:sp>
-      <p:sp>
-        <p:nvSpPr>
-          <p:cNvPr id="2" name="Text Placeholder 1"/>
-          <p:cNvSpPr>
-            <a:spLocks noGrp="1"/>
-          </p:cNvSpPr>
-          <p:nvPr>
-            <p:ph type="body" sz="quarter" idx="11"/>
-          </p:nvPr>
-        </p:nvSpPr>
-        <p:spPr/>
-        <p:txBody>
-          <a:bodyPr/>
-          <a:lstStyle/>
-          <a:p>
-            <a:endParaRPr lang="en-US" dirty="0"/>
-          </a:p>
-        </p:txBody>
-      </p:sp>
-    </p:spTree>
-    <p:extLst>
-      <p:ext uri="{BB962C8B-B14F-4D97-AF65-F5344CB8AC3E}">
-        <p14:creationId xmlns:p14="http://schemas.microsoft.com/office/powerpoint/2010/main" val="3411408423"/>
-      </p:ext>
-    </p:extLst>
-  </p:cSld>
-  <p:clrMapOvr>
-    <a:masterClrMapping/>
-  </p:clrMapOvr>
-  <p:transition>
-    <p:fade/>
-  </p:transition>
-  <p:timing>
-    <p:tnLst>
-      <p:par>
-        <p:cTn id="1" dur="indefinite" restart="never" nodeType="tmRoot"/>
-      </p:par>
-    </p:tnLst>
-  </p:timing>
-</p:sld>
-</file>
-
-<file path=ppt/slides/slide20.xml><?xml version="1.0" encoding="utf-8"?>
+<file path=ppt/slides/slide22.xml><?xml version="1.0" encoding="utf-8"?>
 <p:sld xmlns:a="http://schemas.openxmlformats.org/drawingml/2006/main" xmlns:r="http://schemas.openxmlformats.org/officeDocument/2006/relationships" xmlns:p="http://schemas.openxmlformats.org/presentationml/2006/main">
   <p:cSld>
     <p:spTree>
@@ -16001,7 +17468,7 @@
 </p:sld>
 </file>
 
-<file path=ppt/slides/slide21.xml><?xml version="1.0" encoding="utf-8"?>
+<file path=ppt/slides/slide23.xml><?xml version="1.0" encoding="utf-8"?>
 <p:sld xmlns:a="http://schemas.openxmlformats.org/drawingml/2006/main" xmlns:r="http://schemas.openxmlformats.org/officeDocument/2006/relationships" xmlns:p="http://schemas.openxmlformats.org/presentationml/2006/main">
   <p:cSld>
     <p:spTree>
@@ -16107,7 +17574,7 @@
 </p:sld>
 </file>
 
-<file path=ppt/slides/slide22.xml><?xml version="1.0" encoding="utf-8"?>
+<file path=ppt/slides/slide24.xml><?xml version="1.0" encoding="utf-8"?>
 <p:sld xmlns:a="http://schemas.openxmlformats.org/drawingml/2006/main" xmlns:r="http://schemas.openxmlformats.org/officeDocument/2006/relationships" xmlns:p="http://schemas.openxmlformats.org/presentationml/2006/main">
   <p:cSld>
     <p:spTree>
@@ -16494,7 +17961,7 @@
 </p:sld>
 </file>
 
-<file path=ppt/slides/slide23.xml><?xml version="1.0" encoding="utf-8"?>
+<file path=ppt/slides/slide25.xml><?xml version="1.0" encoding="utf-8"?>
 <p:sld xmlns:a="http://schemas.openxmlformats.org/drawingml/2006/main" xmlns:r="http://schemas.openxmlformats.org/officeDocument/2006/relationships" xmlns:p="http://schemas.openxmlformats.org/presentationml/2006/main">
   <p:cSld>
     <p:spTree>
@@ -18511,7 +19978,7 @@
 </p:sld>
 </file>
 
-<file path=ppt/slides/slide24.xml><?xml version="1.0" encoding="utf-8"?>
+<file path=ppt/slides/slide26.xml><?xml version="1.0" encoding="utf-8"?>
 <p:sld xmlns:a="http://schemas.openxmlformats.org/drawingml/2006/main" xmlns:r="http://schemas.openxmlformats.org/officeDocument/2006/relationships" xmlns:p="http://schemas.openxmlformats.org/presentationml/2006/main">
   <p:cSld>
     <p:spTree>
@@ -20267,7 +21734,7 @@
 </p:sld>
 </file>
 
-<file path=ppt/slides/slide25.xml><?xml version="1.0" encoding="utf-8"?>
+<file path=ppt/slides/slide27.xml><?xml version="1.0" encoding="utf-8"?>
 <p:sld xmlns:a="http://schemas.openxmlformats.org/drawingml/2006/main" xmlns:r="http://schemas.openxmlformats.org/officeDocument/2006/relationships" xmlns:p="http://schemas.openxmlformats.org/presentationml/2006/main">
   <p:cSld>
     <p:spTree>
@@ -20469,7 +21936,7 @@
 </p:sld>
 </file>
 
-<file path=ppt/slides/slide26.xml><?xml version="1.0" encoding="utf-8"?>
+<file path=ppt/slides/slide28.xml><?xml version="1.0" encoding="utf-8"?>
 <p:sld xmlns:a="http://schemas.openxmlformats.org/drawingml/2006/main" xmlns:r="http://schemas.openxmlformats.org/officeDocument/2006/relationships" xmlns:p="http://schemas.openxmlformats.org/presentationml/2006/main">
   <p:cSld>
     <p:spTree>

</xml_diff>